<commit_message>
just fig9 ppt and pdf
</commit_message>
<xml_diff>
--- a/FGCS-2019/reworked-fig9.pptx
+++ b/FGCS-2019/reworked-fig9.pptx
@@ -1171,7 +1171,7 @@
           <a:p>
             <a:fld id="{2DE544F1-4EB3-B943-BAC8-4587CDEC2BDB}" type="datetimeFigureOut">
               <a:rPr lang="en-US" smtClean="0"/>
-              <a:t>10/16/19</a:t>
+              <a:t>10/22/19</a:t>
             </a:fld>
             <a:endParaRPr lang="en-US"/>
           </a:p>
@@ -1369,7 +1369,7 @@
           <a:p>
             <a:fld id="{2DE544F1-4EB3-B943-BAC8-4587CDEC2BDB}" type="datetimeFigureOut">
               <a:rPr lang="en-US" smtClean="0"/>
-              <a:t>10/16/19</a:t>
+              <a:t>10/22/19</a:t>
             </a:fld>
             <a:endParaRPr lang="en-US"/>
           </a:p>
@@ -1577,7 +1577,7 @@
           <a:p>
             <a:fld id="{2DE544F1-4EB3-B943-BAC8-4587CDEC2BDB}" type="datetimeFigureOut">
               <a:rPr lang="en-US" smtClean="0"/>
-              <a:t>10/16/19</a:t>
+              <a:t>10/22/19</a:t>
             </a:fld>
             <a:endParaRPr lang="en-US"/>
           </a:p>
@@ -1775,7 +1775,7 @@
           <a:p>
             <a:fld id="{2DE544F1-4EB3-B943-BAC8-4587CDEC2BDB}" type="datetimeFigureOut">
               <a:rPr lang="en-US" smtClean="0"/>
-              <a:t>10/16/19</a:t>
+              <a:t>10/22/19</a:t>
             </a:fld>
             <a:endParaRPr lang="en-US"/>
           </a:p>
@@ -2050,7 +2050,7 @@
           <a:p>
             <a:fld id="{2DE544F1-4EB3-B943-BAC8-4587CDEC2BDB}" type="datetimeFigureOut">
               <a:rPr lang="en-US" smtClean="0"/>
-              <a:t>10/16/19</a:t>
+              <a:t>10/22/19</a:t>
             </a:fld>
             <a:endParaRPr lang="en-US"/>
           </a:p>
@@ -2315,7 +2315,7 @@
           <a:p>
             <a:fld id="{2DE544F1-4EB3-B943-BAC8-4587CDEC2BDB}" type="datetimeFigureOut">
               <a:rPr lang="en-US" smtClean="0"/>
-              <a:t>10/16/19</a:t>
+              <a:t>10/22/19</a:t>
             </a:fld>
             <a:endParaRPr lang="en-US"/>
           </a:p>
@@ -2727,7 +2727,7 @@
           <a:p>
             <a:fld id="{2DE544F1-4EB3-B943-BAC8-4587CDEC2BDB}" type="datetimeFigureOut">
               <a:rPr lang="en-US" smtClean="0"/>
-              <a:t>10/16/19</a:t>
+              <a:t>10/22/19</a:t>
             </a:fld>
             <a:endParaRPr lang="en-US"/>
           </a:p>
@@ -2868,7 +2868,7 @@
           <a:p>
             <a:fld id="{2DE544F1-4EB3-B943-BAC8-4587CDEC2BDB}" type="datetimeFigureOut">
               <a:rPr lang="en-US" smtClean="0"/>
-              <a:t>10/16/19</a:t>
+              <a:t>10/22/19</a:t>
             </a:fld>
             <a:endParaRPr lang="en-US"/>
           </a:p>
@@ -2981,7 +2981,7 @@
           <a:p>
             <a:fld id="{2DE544F1-4EB3-B943-BAC8-4587CDEC2BDB}" type="datetimeFigureOut">
               <a:rPr lang="en-US" smtClean="0"/>
-              <a:t>10/16/19</a:t>
+              <a:t>10/22/19</a:t>
             </a:fld>
             <a:endParaRPr lang="en-US"/>
           </a:p>
@@ -3292,7 +3292,7 @@
           <a:p>
             <a:fld id="{2DE544F1-4EB3-B943-BAC8-4587CDEC2BDB}" type="datetimeFigureOut">
               <a:rPr lang="en-US" smtClean="0"/>
-              <a:t>10/16/19</a:t>
+              <a:t>10/22/19</a:t>
             </a:fld>
             <a:endParaRPr lang="en-US"/>
           </a:p>
@@ -3580,7 +3580,7 @@
           <a:p>
             <a:fld id="{2DE544F1-4EB3-B943-BAC8-4587CDEC2BDB}" type="datetimeFigureOut">
               <a:rPr lang="en-US" smtClean="0"/>
-              <a:t>10/16/19</a:t>
+              <a:t>10/22/19</a:t>
             </a:fld>
             <a:endParaRPr lang="en-US"/>
           </a:p>
@@ -3821,7 +3821,7 @@
           <a:p>
             <a:fld id="{2DE544F1-4EB3-B943-BAC8-4587CDEC2BDB}" type="datetimeFigureOut">
               <a:rPr lang="en-US" smtClean="0"/>
-              <a:t>10/16/19</a:t>
+              <a:t>10/22/19</a:t>
             </a:fld>
             <a:endParaRPr lang="en-US"/>
           </a:p>
@@ -4240,68 +4240,6 @@
       </p:grpSpPr>
       <p:sp>
         <p:nvSpPr>
-          <p:cNvPr id="151" name="Oval 150">
-            <a:extLst>
-              <a:ext uri="{FF2B5EF4-FFF2-40B4-BE49-F238E27FC236}">
-                <a16:creationId xmlns:a16="http://schemas.microsoft.com/office/drawing/2014/main" id="{5BBF50D5-70D8-184D-BFAB-5DDC884729D2}"/>
-              </a:ext>
-            </a:extLst>
-          </p:cNvPr>
-          <p:cNvSpPr/>
-          <p:nvPr/>
-        </p:nvSpPr>
-        <p:spPr>
-          <a:xfrm>
-            <a:off x="4111139" y="953745"/>
-            <a:ext cx="394531" cy="394531"/>
-          </a:xfrm>
-          <a:prstGeom prst="ellipse">
-            <a:avLst/>
-          </a:prstGeom>
-          <a:solidFill>
-            <a:schemeClr val="accent3"/>
-          </a:solidFill>
-          <a:ln w="25400">
-            <a:solidFill>
-              <a:schemeClr val="tx1"/>
-            </a:solidFill>
-          </a:ln>
-        </p:spPr>
-        <p:style>
-          <a:lnRef idx="2">
-            <a:schemeClr val="accent1">
-              <a:shade val="50000"/>
-            </a:schemeClr>
-          </a:lnRef>
-          <a:fillRef idx="1">
-            <a:schemeClr val="accent1"/>
-          </a:fillRef>
-          <a:effectRef idx="0">
-            <a:schemeClr val="accent1"/>
-          </a:effectRef>
-          <a:fontRef idx="minor">
-            <a:schemeClr val="lt1"/>
-          </a:fontRef>
-        </p:style>
-        <p:txBody>
-          <a:bodyPr rot="0" spcFirstLastPara="0" vertOverflow="overflow" horzOverflow="overflow" vert="horz" wrap="square" lIns="56757" tIns="28378" rIns="56757" bIns="28378" numCol="1" spcCol="0" rtlCol="0" fromWordArt="0" anchor="ctr" anchorCtr="0" forceAA="0" compatLnSpc="1">
-            <a:prstTxWarp prst="textNoShape">
-              <a:avLst/>
-            </a:prstTxWarp>
-            <a:noAutofit/>
-          </a:bodyPr>
-          <a:lstStyle/>
-          <a:p>
-            <a:pPr algn="ctr"/>
-            <a:endParaRPr lang="en-US" sz="1200">
-              <a:latin typeface="+mj-lt"/>
-              <a:cs typeface="Times New Roman" panose="02020603050405020304" pitchFamily="18" charset="0"/>
-            </a:endParaRPr>
-          </a:p>
-        </p:txBody>
-      </p:sp>
-      <p:sp>
-        <p:nvSpPr>
           <p:cNvPr id="153" name="Oval 152">
             <a:extLst>
               <a:ext uri="{FF2B5EF4-FFF2-40B4-BE49-F238E27FC236}">
@@ -4705,44 +4643,6 @@
               <a:latin typeface="+mj-lt"/>
               <a:cs typeface="Times New Roman" panose="02020603050405020304" pitchFamily="18" charset="0"/>
             </a:endParaRPr>
-          </a:p>
-        </p:txBody>
-      </p:sp>
-      <p:sp>
-        <p:nvSpPr>
-          <p:cNvPr id="28" name="TextBox 27">
-            <a:extLst>
-              <a:ext uri="{FF2B5EF4-FFF2-40B4-BE49-F238E27FC236}">
-                <a16:creationId xmlns:a16="http://schemas.microsoft.com/office/drawing/2014/main" id="{6C0D91D2-D0BD-3748-8D36-A65DA478E317}"/>
-              </a:ext>
-            </a:extLst>
-          </p:cNvPr>
-          <p:cNvSpPr txBox="1"/>
-          <p:nvPr/>
-        </p:nvSpPr>
-        <p:spPr>
-          <a:xfrm>
-            <a:off x="4114400" y="1014545"/>
-            <a:ext cx="340158" cy="276999"/>
-          </a:xfrm>
-          <a:prstGeom prst="rect">
-            <a:avLst/>
-          </a:prstGeom>
-          <a:noFill/>
-        </p:spPr>
-        <p:txBody>
-          <a:bodyPr wrap="none" rtlCol="0">
-            <a:spAutoFit/>
-          </a:bodyPr>
-          <a:lstStyle/>
-          <a:p>
-            <a:r>
-              <a:rPr lang="en-US" sz="1200" dirty="0">
-                <a:latin typeface="+mj-lt"/>
-                <a:cs typeface="Times New Roman" panose="02020603050405020304" pitchFamily="18" charset="0"/>
-              </a:rPr>
-              <a:t>e5</a:t>
-            </a:r>
           </a:p>
         </p:txBody>
       </p:sp>
@@ -10546,6 +10446,44 @@
           </a:p>
         </p:txBody>
       </p:sp>
+      <p:sp>
+        <p:nvSpPr>
+          <p:cNvPr id="4" name="TextBox 3">
+            <a:extLst>
+              <a:ext uri="{FF2B5EF4-FFF2-40B4-BE49-F238E27FC236}">
+                <a16:creationId xmlns:a16="http://schemas.microsoft.com/office/drawing/2014/main" id="{7AEA98BA-0B5A-7146-96FE-5B5A0B2795FB}"/>
+              </a:ext>
+            </a:extLst>
+          </p:cNvPr>
+          <p:cNvSpPr txBox="1"/>
+          <p:nvPr/>
+        </p:nvSpPr>
+        <p:spPr>
+          <a:xfrm>
+            <a:off x="4122624" y="999183"/>
+            <a:ext cx="338554" cy="276999"/>
+          </a:xfrm>
+          <a:prstGeom prst="rect">
+            <a:avLst/>
+          </a:prstGeom>
+          <a:noFill/>
+        </p:spPr>
+        <p:txBody>
+          <a:bodyPr wrap="none" rtlCol="0">
+            <a:spAutoFit/>
+          </a:bodyPr>
+          <a:lstStyle/>
+          <a:p>
+            <a:r>
+              <a:rPr lang="en-US" sz="1200" dirty="0">
+                <a:latin typeface="+mj-lt"/>
+                <a:cs typeface="Times New Roman" panose="02020603050405020304" pitchFamily="18" charset="0"/>
+              </a:rPr>
+              <a:t>e5</a:t>
+            </a:r>
+          </a:p>
+        </p:txBody>
+      </p:sp>
     </p:spTree>
     <p:extLst>
       <p:ext uri="{BB962C8B-B14F-4D97-AF65-F5344CB8AC3E}">

</xml_diff>